<commit_message>
Reworked object-oriented inheritance examples.
</commit_message>
<xml_diff>
--- a/Java for Beginners Part 3.pptx
+++ b/Java for Beginners Part 3.pptx
@@ -11,8 +11,6 @@
     <p:sldId id="259" r:id="rId5"/>
     <p:sldId id="261" r:id="rId6"/>
     <p:sldId id="260" r:id="rId7"/>
-    <p:sldId id="262" r:id="rId8"/>
-    <p:sldId id="263" r:id="rId9"/>
   </p:sldIdLst>
   <p:sldSz cx="12192000" cy="6858000"/>
   <p:notesSz cx="6858000" cy="9144000"/>
@@ -454,7 +452,7 @@
           <a:p>
             <a:fld id="{EEA6F0FC-8420-4A90-9879-FB6878378AD9}" type="datetimeFigureOut">
               <a:rPr lang="en-US" smtClean="0"/>
-              <a:t>7/7/2015</a:t>
+              <a:t>7/8/2015</a:t>
             </a:fld>
             <a:endParaRPr lang="en-US"/>
           </a:p>
@@ -1542,7 +1540,7 @@
           <a:p>
             <a:fld id="{EEA6F0FC-8420-4A90-9879-FB6878378AD9}" type="datetimeFigureOut">
               <a:rPr lang="en-US" smtClean="0"/>
-              <a:t>7/7/2015</a:t>
+              <a:t>7/8/2015</a:t>
             </a:fld>
             <a:endParaRPr lang="en-US"/>
           </a:p>
@@ -2522,7 +2520,7 @@
           <a:p>
             <a:fld id="{EEA6F0FC-8420-4A90-9879-FB6878378AD9}" type="datetimeFigureOut">
               <a:rPr lang="en-US" smtClean="0"/>
-              <a:t>7/7/2015</a:t>
+              <a:t>7/8/2015</a:t>
             </a:fld>
             <a:endParaRPr lang="en-US"/>
           </a:p>
@@ -3656,7 +3654,7 @@
           <a:p>
             <a:fld id="{EEA6F0FC-8420-4A90-9879-FB6878378AD9}" type="datetimeFigureOut">
               <a:rPr lang="en-US" smtClean="0"/>
-              <a:t>7/7/2015</a:t>
+              <a:t>7/8/2015</a:t>
             </a:fld>
             <a:endParaRPr lang="en-US"/>
           </a:p>
@@ -4689,7 +4687,7 @@
           <a:p>
             <a:fld id="{EEA6F0FC-8420-4A90-9879-FB6878378AD9}" type="datetimeFigureOut">
               <a:rPr lang="en-US" smtClean="0"/>
-              <a:t>7/7/2015</a:t>
+              <a:t>7/8/2015</a:t>
             </a:fld>
             <a:endParaRPr lang="en-US"/>
           </a:p>
@@ -5349,7 +5347,7 @@
           <a:p>
             <a:fld id="{EEA6F0FC-8420-4A90-9879-FB6878378AD9}" type="datetimeFigureOut">
               <a:rPr lang="en-US" smtClean="0"/>
-              <a:t>7/7/2015</a:t>
+              <a:t>7/8/2015</a:t>
             </a:fld>
             <a:endParaRPr lang="en-US"/>
           </a:p>
@@ -6210,7 +6208,7 @@
           <a:p>
             <a:fld id="{EEA6F0FC-8420-4A90-9879-FB6878378AD9}" type="datetimeFigureOut">
               <a:rPr lang="en-US" smtClean="0"/>
-              <a:t>7/7/2015</a:t>
+              <a:t>7/8/2015</a:t>
             </a:fld>
             <a:endParaRPr lang="en-US"/>
           </a:p>
@@ -6400,7 +6398,7 @@
           <a:p>
             <a:fld id="{EEA6F0FC-8420-4A90-9879-FB6878378AD9}" type="datetimeFigureOut">
               <a:rPr lang="en-US" smtClean="0"/>
-              <a:t>7/7/2015</a:t>
+              <a:t>7/8/2015</a:t>
             </a:fld>
             <a:endParaRPr lang="en-US"/>
           </a:p>
@@ -7372,7 +7370,7 @@
           <a:p>
             <a:fld id="{EEA6F0FC-8420-4A90-9879-FB6878378AD9}" type="datetimeFigureOut">
               <a:rPr lang="en-US" smtClean="0"/>
-              <a:t>7/7/2015</a:t>
+              <a:t>7/8/2015</a:t>
             </a:fld>
             <a:endParaRPr lang="en-US"/>
           </a:p>
@@ -7583,7 +7581,7 @@
           <a:p>
             <a:fld id="{EEA6F0FC-8420-4A90-9879-FB6878378AD9}" type="datetimeFigureOut">
               <a:rPr lang="en-US" smtClean="0"/>
-              <a:t>7/7/2015</a:t>
+              <a:t>7/8/2015</a:t>
             </a:fld>
             <a:endParaRPr lang="en-US"/>
           </a:p>
@@ -8617,7 +8615,7 @@
           <a:p>
             <a:fld id="{EEA6F0FC-8420-4A90-9879-FB6878378AD9}" type="datetimeFigureOut">
               <a:rPr lang="en-US" smtClean="0"/>
-              <a:t>7/7/2015</a:t>
+              <a:t>7/8/2015</a:t>
             </a:fld>
             <a:endParaRPr lang="en-US"/>
           </a:p>
@@ -8889,7 +8887,7 @@
           <a:p>
             <a:fld id="{EEA6F0FC-8420-4A90-9879-FB6878378AD9}" type="datetimeFigureOut">
               <a:rPr lang="en-US" smtClean="0"/>
-              <a:t>7/7/2015</a:t>
+              <a:t>7/8/2015</a:t>
             </a:fld>
             <a:endParaRPr lang="en-US"/>
           </a:p>
@@ -9299,7 +9297,7 @@
           <a:p>
             <a:fld id="{EEA6F0FC-8420-4A90-9879-FB6878378AD9}" type="datetimeFigureOut">
               <a:rPr lang="en-US" smtClean="0"/>
-              <a:t>7/7/2015</a:t>
+              <a:t>7/8/2015</a:t>
             </a:fld>
             <a:endParaRPr lang="en-US"/>
           </a:p>
@@ -9426,7 +9424,7 @@
           <a:p>
             <a:fld id="{EEA6F0FC-8420-4A90-9879-FB6878378AD9}" type="datetimeFigureOut">
               <a:rPr lang="en-US" smtClean="0"/>
-              <a:t>7/7/2015</a:t>
+              <a:t>7/8/2015</a:t>
             </a:fld>
             <a:endParaRPr lang="en-US"/>
           </a:p>
@@ -9521,7 +9519,7 @@
           <a:p>
             <a:fld id="{EEA6F0FC-8420-4A90-9879-FB6878378AD9}" type="datetimeFigureOut">
               <a:rPr lang="en-US" smtClean="0"/>
-              <a:t>7/7/2015</a:t>
+              <a:t>7/8/2015</a:t>
             </a:fld>
             <a:endParaRPr lang="en-US"/>
           </a:p>
@@ -10602,7 +10600,7 @@
           <a:p>
             <a:fld id="{EEA6F0FC-8420-4A90-9879-FB6878378AD9}" type="datetimeFigureOut">
               <a:rPr lang="en-US" smtClean="0"/>
-              <a:t>7/7/2015</a:t>
+              <a:t>7/8/2015</a:t>
             </a:fld>
             <a:endParaRPr lang="en-US"/>
           </a:p>
@@ -11710,7 +11708,7 @@
           <a:p>
             <a:fld id="{EEA6F0FC-8420-4A90-9879-FB6878378AD9}" type="datetimeFigureOut">
               <a:rPr lang="en-US" smtClean="0"/>
-              <a:t>7/7/2015</a:t>
+              <a:t>7/8/2015</a:t>
             </a:fld>
             <a:endParaRPr lang="en-US"/>
           </a:p>
@@ -12707,7 +12705,7 @@
           <a:p>
             <a:fld id="{EEA6F0FC-8420-4A90-9879-FB6878378AD9}" type="datetimeFigureOut">
               <a:rPr lang="en-US" smtClean="0"/>
-              <a:t>7/7/2015</a:t>
+              <a:t>7/8/2015</a:t>
             </a:fld>
             <a:endParaRPr lang="en-US"/>
           </a:p>
@@ -13290,11 +13288,7 @@
             </a:br>
             <a:r>
               <a:rPr lang="en-US" dirty="0" smtClean="0"/>
-              <a:t>Part </a:t>
-            </a:r>
-            <a:r>
-              <a:rPr lang="en-US" dirty="0" smtClean="0"/>
-              <a:t>3</a:t>
+              <a:t>Part 3</a:t>
             </a:r>
             <a:endParaRPr lang="en-US" dirty="0"/>
           </a:p>
@@ -13890,166 +13884,6 @@
     <p:extLst>
       <p:ext uri="{BB962C8B-B14F-4D97-AF65-F5344CB8AC3E}">
         <p14:creationId xmlns:p14="http://schemas.microsoft.com/office/powerpoint/2010/main" val="2107832681"/>
-      </p:ext>
-    </p:extLst>
-  </p:cSld>
-  <p:clrMapOvr>
-    <a:masterClrMapping/>
-  </p:clrMapOvr>
-</p:sld>
-</file>
-
-<file path=ppt/slides/slide7.xml><?xml version="1.0" encoding="utf-8"?>
-<p:sld xmlns:a="http://schemas.openxmlformats.org/drawingml/2006/main" xmlns:r="http://schemas.openxmlformats.org/officeDocument/2006/relationships" xmlns:p="http://schemas.openxmlformats.org/presentationml/2006/main">
-  <p:cSld>
-    <p:spTree>
-      <p:nvGrpSpPr>
-        <p:cNvPr id="1" name=""/>
-        <p:cNvGrpSpPr/>
-        <p:nvPr/>
-      </p:nvGrpSpPr>
-      <p:grpSpPr>
-        <a:xfrm>
-          <a:off x="0" y="0"/>
-          <a:ext cx="0" cy="0"/>
-          <a:chOff x="0" y="0"/>
-          <a:chExt cx="0" cy="0"/>
-        </a:xfrm>
-      </p:grpSpPr>
-      <p:sp>
-        <p:nvSpPr>
-          <p:cNvPr id="2" name="Title 1"/>
-          <p:cNvSpPr>
-            <a:spLocks noGrp="1"/>
-          </p:cNvSpPr>
-          <p:nvPr>
-            <p:ph type="title"/>
-          </p:nvPr>
-        </p:nvSpPr>
-        <p:spPr/>
-        <p:txBody>
-          <a:bodyPr/>
-          <a:lstStyle/>
-          <a:p>
-            <a:r>
-              <a:rPr lang="en-US" dirty="0" smtClean="0"/>
-              <a:t>Abstract classes</a:t>
-            </a:r>
-            <a:endParaRPr lang="en-US" dirty="0"/>
-          </a:p>
-        </p:txBody>
-      </p:sp>
-      <p:sp>
-        <p:nvSpPr>
-          <p:cNvPr id="3" name="Content Placeholder 2"/>
-          <p:cNvSpPr>
-            <a:spLocks noGrp="1"/>
-          </p:cNvSpPr>
-          <p:nvPr>
-            <p:ph idx="1"/>
-          </p:nvPr>
-        </p:nvSpPr>
-        <p:spPr/>
-        <p:txBody>
-          <a:bodyPr/>
-          <a:lstStyle/>
-          <a:p>
-            <a:r>
-              <a:rPr lang="en-US" dirty="0" smtClean="0"/>
-              <a:t>Classes defined as “abstract” can be extended, but cannot be created directly.</a:t>
-            </a:r>
-          </a:p>
-          <a:p>
-            <a:r>
-              <a:rPr lang="en-US" dirty="0" smtClean="0"/>
-              <a:t>This is common when we want to create a building block class containing shared code that will be reused many times for specific cases.</a:t>
-            </a:r>
-          </a:p>
-          <a:p>
-            <a:endParaRPr lang="en-US" dirty="0"/>
-          </a:p>
-        </p:txBody>
-      </p:sp>
-    </p:spTree>
-    <p:extLst>
-      <p:ext uri="{BB962C8B-B14F-4D97-AF65-F5344CB8AC3E}">
-        <p14:creationId xmlns:p14="http://schemas.microsoft.com/office/powerpoint/2010/main" val="2928219536"/>
-      </p:ext>
-    </p:extLst>
-  </p:cSld>
-  <p:clrMapOvr>
-    <a:masterClrMapping/>
-  </p:clrMapOvr>
-</p:sld>
-</file>
-
-<file path=ppt/slides/slide8.xml><?xml version="1.0" encoding="utf-8"?>
-<p:sld xmlns:a="http://schemas.openxmlformats.org/drawingml/2006/main" xmlns:r="http://schemas.openxmlformats.org/officeDocument/2006/relationships" xmlns:p="http://schemas.openxmlformats.org/presentationml/2006/main">
-  <p:cSld>
-    <p:spTree>
-      <p:nvGrpSpPr>
-        <p:cNvPr id="1" name=""/>
-        <p:cNvGrpSpPr/>
-        <p:nvPr/>
-      </p:nvGrpSpPr>
-      <p:grpSpPr>
-        <a:xfrm>
-          <a:off x="0" y="0"/>
-          <a:ext cx="0" cy="0"/>
-          <a:chOff x="0" y="0"/>
-          <a:chExt cx="0" cy="0"/>
-        </a:xfrm>
-      </p:grpSpPr>
-      <p:sp>
-        <p:nvSpPr>
-          <p:cNvPr id="2" name="Title 1"/>
-          <p:cNvSpPr>
-            <a:spLocks noGrp="1"/>
-          </p:cNvSpPr>
-          <p:nvPr>
-            <p:ph type="title"/>
-          </p:nvPr>
-        </p:nvSpPr>
-        <p:spPr/>
-        <p:txBody>
-          <a:bodyPr/>
-          <a:lstStyle/>
-          <a:p>
-            <a:r>
-              <a:rPr lang="en-US" dirty="0" smtClean="0"/>
-              <a:t>Exercise 09 – abstract classes</a:t>
-            </a:r>
-            <a:endParaRPr lang="en-US" dirty="0"/>
-          </a:p>
-        </p:txBody>
-      </p:sp>
-      <p:sp>
-        <p:nvSpPr>
-          <p:cNvPr id="3" name="Content Placeholder 2"/>
-          <p:cNvSpPr>
-            <a:spLocks noGrp="1"/>
-          </p:cNvSpPr>
-          <p:nvPr>
-            <p:ph idx="1"/>
-          </p:nvPr>
-        </p:nvSpPr>
-        <p:spPr/>
-        <p:txBody>
-          <a:bodyPr/>
-          <a:lstStyle/>
-          <a:p>
-            <a:r>
-              <a:rPr lang="en-US" dirty="0" smtClean="0"/>
-              <a:t>Look at the differences between this listing and Exercise 08</a:t>
-            </a:r>
-            <a:endParaRPr lang="en-US" dirty="0"/>
-          </a:p>
-        </p:txBody>
-      </p:sp>
-    </p:spTree>
-    <p:extLst>
-      <p:ext uri="{BB962C8B-B14F-4D97-AF65-F5344CB8AC3E}">
-        <p14:creationId xmlns:p14="http://schemas.microsoft.com/office/powerpoint/2010/main" val="2771593764"/>
       </p:ext>
     </p:extLst>
   </p:cSld>

</xml_diff>